<commit_message>
updated XLS and PPT
</commit_message>
<xml_diff>
--- a/unchained-flight-insurance-web/Notes techniques.pptx
+++ b/unchained-flight-insurance-web/Notes techniques.pptx
@@ -7421,7 +7421,7 @@
           <p:nvPr>
             <p:extLst>
               <p:ext uri="{D42A27DB-BD31-4B8C-83A1-F6EECF244321}">
-                <p14:modId xmlns:p14="http://schemas.microsoft.com/office/powerpoint/2010/main" val="719744012"/>
+                <p14:modId xmlns:p14="http://schemas.microsoft.com/office/powerpoint/2010/main" val="1902136941"/>
               </p:ext>
             </p:extLst>
           </p:nvPr>
@@ -7451,7 +7451,7 @@
           <p:nvPr>
             <p:extLst>
               <p:ext uri="{D42A27DB-BD31-4B8C-83A1-F6EECF244321}">
-                <p14:modId xmlns:p14="http://schemas.microsoft.com/office/powerpoint/2010/main" val="3506427998"/>
+                <p14:modId xmlns:p14="http://schemas.microsoft.com/office/powerpoint/2010/main" val="191829292"/>
               </p:ext>
             </p:extLst>
           </p:nvPr>
@@ -8106,7 +8106,7 @@
           <p:nvPr>
             <p:extLst>
               <p:ext uri="{D42A27DB-BD31-4B8C-83A1-F6EECF244321}">
-                <p14:modId xmlns:p14="http://schemas.microsoft.com/office/powerpoint/2010/main" val="1460340685"/>
+                <p14:modId xmlns:p14="http://schemas.microsoft.com/office/powerpoint/2010/main" val="921010583"/>
               </p:ext>
             </p:extLst>
           </p:nvPr>
@@ -12004,7 +12004,7 @@
         </p:nvSpPr>
         <p:spPr>
           <a:xfrm>
-            <a:off x="5858028" y="4278610"/>
+            <a:off x="5628297" y="4285185"/>
             <a:ext cx="1675139" cy="369332"/>
           </a:xfrm>
           <a:prstGeom prst="rect">
@@ -12052,7 +12052,7 @@
         </p:nvSpPr>
         <p:spPr>
           <a:xfrm>
-            <a:off x="5366144" y="6430139"/>
+            <a:off x="5212582" y="6433806"/>
             <a:ext cx="1978747" cy="369332"/>
           </a:xfrm>
           <a:prstGeom prst="rect">
@@ -12390,7 +12390,7 @@
             </a:pathLst>
           </a:custGeom>
           <a:noFill/>
-          <a:ln>
+          <a:ln w="38100">
             <a:solidFill>
               <a:srgbClr val="FF0000"/>
             </a:solidFill>
@@ -12421,6 +12421,172 @@
           </a:p>
         </p:txBody>
       </p:sp>
+      <p:sp>
+        <p:nvSpPr>
+          <p:cNvPr id="15" name="TextBox 14">
+            <a:extLst>
+              <a:ext uri="{FF2B5EF4-FFF2-40B4-BE49-F238E27FC236}">
+                <a16:creationId xmlns:a16="http://schemas.microsoft.com/office/drawing/2014/main" id="{6E3D56D5-5077-4428-A4D8-D179DF910D2D}"/>
+              </a:ext>
+            </a:extLst>
+          </p:cNvPr>
+          <p:cNvSpPr txBox="1"/>
+          <p:nvPr/>
+        </p:nvSpPr>
+        <p:spPr>
+          <a:xfrm>
+            <a:off x="10601172" y="5994058"/>
+            <a:ext cx="1590828" cy="923330"/>
+          </a:xfrm>
+          <a:prstGeom prst="rect">
+            <a:avLst/>
+          </a:prstGeom>
+          <a:noFill/>
+        </p:spPr>
+        <p:txBody>
+          <a:bodyPr wrap="square" rtlCol="0">
+            <a:spAutoFit/>
+          </a:bodyPr>
+          <a:lstStyle/>
+          <a:p>
+            <a:r>
+              <a:rPr lang="fr-CH" dirty="0"/>
+              <a:t>Risk </a:t>
+            </a:r>
+            <a:r>
+              <a:rPr lang="fr-CH" dirty="0" err="1"/>
+              <a:t>is</a:t>
+            </a:r>
+            <a:r>
+              <a:rPr lang="fr-CH" dirty="0"/>
+              <a:t> </a:t>
+            </a:r>
+            <a:r>
+              <a:rPr lang="fr-CH" dirty="0" err="1"/>
+              <a:t>too</a:t>
+            </a:r>
+            <a:r>
+              <a:rPr lang="fr-CH" dirty="0"/>
+              <a:t> high </a:t>
+            </a:r>
+            <a:r>
+              <a:rPr lang="fr-CH" dirty="0" err="1"/>
+              <a:t>so</a:t>
+            </a:r>
+            <a:r>
+              <a:rPr lang="fr-CH" dirty="0"/>
+              <a:t> </a:t>
+            </a:r>
+            <a:r>
+              <a:rPr lang="fr-CH" dirty="0" err="1"/>
+              <a:t>cannot</a:t>
+            </a:r>
+            <a:r>
+              <a:rPr lang="fr-CH" dirty="0"/>
+              <a:t> </a:t>
+            </a:r>
+            <a:r>
+              <a:rPr lang="fr-CH" dirty="0" err="1"/>
+              <a:t>be</a:t>
+            </a:r>
+            <a:r>
+              <a:rPr lang="fr-CH" dirty="0"/>
+              <a:t> </a:t>
+            </a:r>
+            <a:r>
+              <a:rPr lang="fr-CH" dirty="0" err="1"/>
+              <a:t>insured</a:t>
+            </a:r>
+            <a:endParaRPr lang="fr-CH" dirty="0"/>
+          </a:p>
+        </p:txBody>
+      </p:sp>
+      <p:cxnSp>
+        <p:nvCxnSpPr>
+          <p:cNvPr id="17" name="Straight Arrow Connector 16">
+            <a:extLst>
+              <a:ext uri="{FF2B5EF4-FFF2-40B4-BE49-F238E27FC236}">
+                <a16:creationId xmlns:a16="http://schemas.microsoft.com/office/drawing/2014/main" id="{98E9AA18-7DFB-4439-898D-60247A2F0F87}"/>
+              </a:ext>
+            </a:extLst>
+          </p:cNvPr>
+          <p:cNvCxnSpPr>
+            <a:stCxn id="13" idx="3"/>
+          </p:cNvCxnSpPr>
+          <p:nvPr/>
+        </p:nvCxnSpPr>
+        <p:spPr>
+          <a:xfrm flipV="1">
+            <a:off x="7191329" y="6611063"/>
+            <a:ext cx="607965" cy="7409"/>
+          </a:xfrm>
+          <a:prstGeom prst="straightConnector1">
+            <a:avLst/>
+          </a:prstGeom>
+          <a:ln w="38100">
+            <a:solidFill>
+              <a:srgbClr val="FF0000"/>
+            </a:solidFill>
+            <a:tailEnd type="triangle"/>
+          </a:ln>
+        </p:spPr>
+        <p:style>
+          <a:lnRef idx="1">
+            <a:schemeClr val="accent1"/>
+          </a:lnRef>
+          <a:fillRef idx="0">
+            <a:schemeClr val="accent1"/>
+          </a:fillRef>
+          <a:effectRef idx="0">
+            <a:schemeClr val="accent1"/>
+          </a:effectRef>
+          <a:fontRef idx="minor">
+            <a:schemeClr val="tx1"/>
+          </a:fontRef>
+        </p:style>
+      </p:cxnSp>
+      <p:cxnSp>
+        <p:nvCxnSpPr>
+          <p:cNvPr id="18" name="Straight Arrow Connector 17">
+            <a:extLst>
+              <a:ext uri="{FF2B5EF4-FFF2-40B4-BE49-F238E27FC236}">
+                <a16:creationId xmlns:a16="http://schemas.microsoft.com/office/drawing/2014/main" id="{0B00E228-7B9B-497E-B843-85F6F5B003F7}"/>
+              </a:ext>
+            </a:extLst>
+          </p:cNvPr>
+          <p:cNvCxnSpPr/>
+          <p:nvPr/>
+        </p:nvCxnSpPr>
+        <p:spPr>
+          <a:xfrm flipV="1">
+            <a:off x="7217875" y="4469851"/>
+            <a:ext cx="607965" cy="7409"/>
+          </a:xfrm>
+          <a:prstGeom prst="straightConnector1">
+            <a:avLst/>
+          </a:prstGeom>
+          <a:ln w="38100">
+            <a:solidFill>
+              <a:srgbClr val="FF0000"/>
+            </a:solidFill>
+            <a:tailEnd type="triangle"/>
+          </a:ln>
+        </p:spPr>
+        <p:style>
+          <a:lnRef idx="1">
+            <a:schemeClr val="accent1"/>
+          </a:lnRef>
+          <a:fillRef idx="0">
+            <a:schemeClr val="accent1"/>
+          </a:fillRef>
+          <a:effectRef idx="0">
+            <a:schemeClr val="accent1"/>
+          </a:effectRef>
+          <a:fontRef idx="minor">
+            <a:schemeClr val="tx1"/>
+          </a:fontRef>
+        </p:style>
+      </p:cxnSp>
     </p:spTree>
     <p:extLst>
       <p:ext uri="{BB962C8B-B14F-4D97-AF65-F5344CB8AC3E}">

</xml_diff>

<commit_message>
updated schemas on PPT
</commit_message>
<xml_diff>
--- a/unchained-flight-insurance-web/Notes techniques.pptx
+++ b/unchained-flight-insurance-web/Notes techniques.pptx
@@ -2114,7 +2114,7 @@
           <c:spPr>
             <a:ln w="28575" cap="rnd">
               <a:solidFill>
-                <a:schemeClr val="accent1"/>
+                <a:schemeClr val="accent4"/>
               </a:solidFill>
               <a:round/>
             </a:ln>
@@ -2225,7 +2225,7 @@
           <c:spPr>
             <a:ln w="28575" cap="rnd">
               <a:solidFill>
-                <a:schemeClr val="accent2"/>
+                <a:schemeClr val="accent3"/>
               </a:solidFill>
               <a:round/>
             </a:ln>
@@ -2336,7 +2336,7 @@
           <c:spPr>
             <a:ln w="28575" cap="rnd">
               <a:solidFill>
-                <a:schemeClr val="accent3"/>
+                <a:schemeClr val="accent2"/>
               </a:solidFill>
               <a:round/>
             </a:ln>
@@ -2811,7 +2811,7 @@
               <c:strCache>
                 <c:ptCount val="1"/>
                 <c:pt idx="0">
-                  <c:v>Ultimate</c:v>
+                  <c:v>Gold</c:v>
                 </c:pt>
               </c:strCache>
             </c:strRef>
@@ -2819,7 +2819,7 @@
           <c:spPr>
             <a:ln w="28575" cap="rnd">
               <a:solidFill>
-                <a:schemeClr val="accent1"/>
+                <a:schemeClr val="accent4"/>
               </a:solidFill>
               <a:round/>
             </a:ln>
@@ -2922,7 +2922,7 @@
               <c:strCache>
                 <c:ptCount val="1"/>
                 <c:pt idx="0">
-                  <c:v>Medium</c:v>
+                  <c:v>Silver</c:v>
                 </c:pt>
               </c:strCache>
             </c:strRef>
@@ -2930,7 +2930,7 @@
           <c:spPr>
             <a:ln w="28575" cap="rnd">
               <a:solidFill>
-                <a:schemeClr val="accent2"/>
+                <a:schemeClr val="accent3"/>
               </a:solidFill>
               <a:round/>
             </a:ln>
@@ -3033,7 +3033,7 @@
               <c:strCache>
                 <c:ptCount val="1"/>
                 <c:pt idx="0">
-                  <c:v>Basic</c:v>
+                  <c:v>Bronze</c:v>
                 </c:pt>
               </c:strCache>
             </c:strRef>
@@ -3041,7 +3041,7 @@
           <c:spPr>
             <a:ln w="28575" cap="rnd">
               <a:solidFill>
-                <a:schemeClr val="accent3"/>
+                <a:schemeClr val="accent2"/>
               </a:solidFill>
               <a:round/>
             </a:ln>
@@ -12501,6 +12501,9 @@
           <a:avLst/>
         </a:prstGeom>
         <a:ln xmlns:a="http://schemas.openxmlformats.org/drawingml/2006/main" w="28575">
+          <a:solidFill>
+            <a:schemeClr val="accent4"/>
+          </a:solidFill>
           <a:prstDash val="dash"/>
         </a:ln>
       </cdr:spPr>
@@ -12651,6 +12654,9 @@
           <a:avLst/>
         </a:prstGeom>
         <a:ln xmlns:a="http://schemas.openxmlformats.org/drawingml/2006/main" w="28575">
+          <a:solidFill>
+            <a:schemeClr val="accent4"/>
+          </a:solidFill>
           <a:prstDash val="dash"/>
         </a:ln>
       </cdr:spPr>
@@ -12873,7 +12879,7 @@
           <a:p>
             <a:fld id="{15A1B14F-DD63-4D69-B4A0-7EFAFE1980FC}" type="datetimeFigureOut">
               <a:rPr lang="fr-CH" smtClean="0"/>
-              <a:t>07.06.2018</a:t>
+              <a:t>08.06.2018</a:t>
             </a:fld>
             <a:endParaRPr lang="fr-CH"/>
           </a:p>
@@ -13073,7 +13079,7 @@
           <a:p>
             <a:fld id="{15A1B14F-DD63-4D69-B4A0-7EFAFE1980FC}" type="datetimeFigureOut">
               <a:rPr lang="fr-CH" smtClean="0"/>
-              <a:t>07.06.2018</a:t>
+              <a:t>08.06.2018</a:t>
             </a:fld>
             <a:endParaRPr lang="fr-CH"/>
           </a:p>
@@ -13283,7 +13289,7 @@
           <a:p>
             <a:fld id="{15A1B14F-DD63-4D69-B4A0-7EFAFE1980FC}" type="datetimeFigureOut">
               <a:rPr lang="fr-CH" smtClean="0"/>
-              <a:t>07.06.2018</a:t>
+              <a:t>08.06.2018</a:t>
             </a:fld>
             <a:endParaRPr lang="fr-CH"/>
           </a:p>
@@ -13483,7 +13489,7 @@
           <a:p>
             <a:fld id="{15A1B14F-DD63-4D69-B4A0-7EFAFE1980FC}" type="datetimeFigureOut">
               <a:rPr lang="fr-CH" smtClean="0"/>
-              <a:t>07.06.2018</a:t>
+              <a:t>08.06.2018</a:t>
             </a:fld>
             <a:endParaRPr lang="fr-CH"/>
           </a:p>
@@ -13759,7 +13765,7 @@
           <a:p>
             <a:fld id="{15A1B14F-DD63-4D69-B4A0-7EFAFE1980FC}" type="datetimeFigureOut">
               <a:rPr lang="fr-CH" smtClean="0"/>
-              <a:t>07.06.2018</a:t>
+              <a:t>08.06.2018</a:t>
             </a:fld>
             <a:endParaRPr lang="fr-CH"/>
           </a:p>
@@ -14027,7 +14033,7 @@
           <a:p>
             <a:fld id="{15A1B14F-DD63-4D69-B4A0-7EFAFE1980FC}" type="datetimeFigureOut">
               <a:rPr lang="fr-CH" smtClean="0"/>
-              <a:t>07.06.2018</a:t>
+              <a:t>08.06.2018</a:t>
             </a:fld>
             <a:endParaRPr lang="fr-CH"/>
           </a:p>
@@ -14442,7 +14448,7 @@
           <a:p>
             <a:fld id="{15A1B14F-DD63-4D69-B4A0-7EFAFE1980FC}" type="datetimeFigureOut">
               <a:rPr lang="fr-CH" smtClean="0"/>
-              <a:t>07.06.2018</a:t>
+              <a:t>08.06.2018</a:t>
             </a:fld>
             <a:endParaRPr lang="fr-CH"/>
           </a:p>
@@ -14584,7 +14590,7 @@
           <a:p>
             <a:fld id="{15A1B14F-DD63-4D69-B4A0-7EFAFE1980FC}" type="datetimeFigureOut">
               <a:rPr lang="fr-CH" smtClean="0"/>
-              <a:t>07.06.2018</a:t>
+              <a:t>08.06.2018</a:t>
             </a:fld>
             <a:endParaRPr lang="fr-CH"/>
           </a:p>
@@ -14697,7 +14703,7 @@
           <a:p>
             <a:fld id="{15A1B14F-DD63-4D69-B4A0-7EFAFE1980FC}" type="datetimeFigureOut">
               <a:rPr lang="fr-CH" smtClean="0"/>
-              <a:t>07.06.2018</a:t>
+              <a:t>08.06.2018</a:t>
             </a:fld>
             <a:endParaRPr lang="fr-CH"/>
           </a:p>
@@ -15010,7 +15016,7 @@
           <a:p>
             <a:fld id="{15A1B14F-DD63-4D69-B4A0-7EFAFE1980FC}" type="datetimeFigureOut">
               <a:rPr lang="fr-CH" smtClean="0"/>
-              <a:t>07.06.2018</a:t>
+              <a:t>08.06.2018</a:t>
             </a:fld>
             <a:endParaRPr lang="fr-CH"/>
           </a:p>
@@ -15299,7 +15305,7 @@
           <a:p>
             <a:fld id="{15A1B14F-DD63-4D69-B4A0-7EFAFE1980FC}" type="datetimeFigureOut">
               <a:rPr lang="fr-CH" smtClean="0"/>
-              <a:t>07.06.2018</a:t>
+              <a:t>08.06.2018</a:t>
             </a:fld>
             <a:endParaRPr lang="fr-CH"/>
           </a:p>
@@ -15542,7 +15548,7 @@
           <a:p>
             <a:fld id="{15A1B14F-DD63-4D69-B4A0-7EFAFE1980FC}" type="datetimeFigureOut">
               <a:rPr lang="fr-CH" smtClean="0"/>
-              <a:t>07.06.2018</a:t>
+              <a:t>08.06.2018</a:t>
             </a:fld>
             <a:endParaRPr lang="fr-CH"/>
           </a:p>
@@ -16225,8 +16231,8 @@
           </a:p>
         </p:txBody>
       </p:sp>
-      <mc:AlternateContent xmlns:mc="http://schemas.openxmlformats.org/markup-compatibility/2006">
-        <mc:Choice xmlns:a14="http://schemas.microsoft.com/office/drawing/2010/main" Requires="a14">
+      <mc:AlternateContent xmlns:mc="http://schemas.openxmlformats.org/markup-compatibility/2006" xmlns:a14="http://schemas.microsoft.com/office/drawing/2010/main">
+        <mc:Choice Requires="a14">
           <p:sp>
             <p:nvSpPr>
               <p:cNvPr id="4" name="TextBox 3">
@@ -16398,7 +16404,7 @@
             </p:txBody>
           </p:sp>
         </mc:Choice>
-        <mc:Fallback>
+        <mc:Fallback xmlns="">
           <p:sp>
             <p:nvSpPr>
               <p:cNvPr id="4" name="TextBox 3">
@@ -17192,7 +17198,7 @@
           <p:nvPr>
             <p:extLst>
               <p:ext uri="{D42A27DB-BD31-4B8C-83A1-F6EECF244321}">
-                <p14:modId xmlns:p14="http://schemas.microsoft.com/office/powerpoint/2010/main" val="1994028662"/>
+                <p14:modId xmlns:p14="http://schemas.microsoft.com/office/powerpoint/2010/main" val="2065261845"/>
               </p:ext>
             </p:extLst>
           </p:nvPr>
@@ -17631,7 +17637,7 @@
           <p:nvPr>
             <p:extLst>
               <p:ext uri="{D42A27DB-BD31-4B8C-83A1-F6EECF244321}">
-                <p14:modId xmlns:p14="http://schemas.microsoft.com/office/powerpoint/2010/main" val="1820238542"/>
+                <p14:modId xmlns:p14="http://schemas.microsoft.com/office/powerpoint/2010/main" val="2404437516"/>
               </p:ext>
             </p:extLst>
           </p:nvPr>

</xml_diff>